<commit_message>
Add update overview fig
</commit_message>
<xml_diff>
--- a/figs/overview.pptx
+++ b/figs/overview.pptx
@@ -5,7 +5,8 @@
     <p:sldMasterId id="2147483672" r:id="rId1"/>
   </p:sldMasterIdLst>
   <p:sldIdLst>
-    <p:sldId id="256" r:id="rId2"/>
+    <p:sldId id="257" r:id="rId2"/>
+    <p:sldId id="256" r:id="rId3"/>
   </p:sldIdLst>
   <p:sldSz cx="12192000" cy="4846638"/>
   <p:notesSz cx="6858000" cy="9144000"/>
@@ -104,6 +105,11 @@
       </a:defRPr>
     </a:lvl9pPr>
   </p:defaultTextStyle>
+  <p:extLst>
+    <p:ext uri="{EFAFB233-063F-42B5-8137-9DF3F51BA10A}">
+      <p15:sldGuideLst xmlns:p15="http://schemas.microsoft.com/office/powerpoint/2012/main"/>
+    </p:ext>
+  </p:extLst>
 </p:presentation>
 </file>
 
@@ -238,7 +244,7 @@
           <a:p>
             <a:fld id="{536E8168-2CAE-334E-A057-B1B8C2D249B0}" type="datetimeFigureOut">
               <a:rPr lang="en-US" smtClean="0"/>
-              <a:t>4/18/24</a:t>
+              <a:t>4/19/24</a:t>
             </a:fld>
             <a:endParaRPr lang="en-US"/>
           </a:p>
@@ -408,7 +414,7 @@
           <a:p>
             <a:fld id="{536E8168-2CAE-334E-A057-B1B8C2D249B0}" type="datetimeFigureOut">
               <a:rPr lang="en-US" smtClean="0"/>
-              <a:t>4/18/24</a:t>
+              <a:t>4/19/24</a:t>
             </a:fld>
             <a:endParaRPr lang="en-US"/>
           </a:p>
@@ -588,7 +594,7 @@
           <a:p>
             <a:fld id="{536E8168-2CAE-334E-A057-B1B8C2D249B0}" type="datetimeFigureOut">
               <a:rPr lang="en-US" smtClean="0"/>
-              <a:t>4/18/24</a:t>
+              <a:t>4/19/24</a:t>
             </a:fld>
             <a:endParaRPr lang="en-US"/>
           </a:p>
@@ -758,7 +764,7 @@
           <a:p>
             <a:fld id="{536E8168-2CAE-334E-A057-B1B8C2D249B0}" type="datetimeFigureOut">
               <a:rPr lang="en-US" smtClean="0"/>
-              <a:t>4/18/24</a:t>
+              <a:t>4/19/24</a:t>
             </a:fld>
             <a:endParaRPr lang="en-US"/>
           </a:p>
@@ -1004,7 +1010,7 @@
           <a:p>
             <a:fld id="{536E8168-2CAE-334E-A057-B1B8C2D249B0}" type="datetimeFigureOut">
               <a:rPr lang="en-US" smtClean="0"/>
-              <a:t>4/18/24</a:t>
+              <a:t>4/19/24</a:t>
             </a:fld>
             <a:endParaRPr lang="en-US"/>
           </a:p>
@@ -1236,7 +1242,7 @@
           <a:p>
             <a:fld id="{536E8168-2CAE-334E-A057-B1B8C2D249B0}" type="datetimeFigureOut">
               <a:rPr lang="en-US" smtClean="0"/>
-              <a:t>4/18/24</a:t>
+              <a:t>4/19/24</a:t>
             </a:fld>
             <a:endParaRPr lang="en-US"/>
           </a:p>
@@ -1603,7 +1609,7 @@
           <a:p>
             <a:fld id="{536E8168-2CAE-334E-A057-B1B8C2D249B0}" type="datetimeFigureOut">
               <a:rPr lang="en-US" smtClean="0"/>
-              <a:t>4/18/24</a:t>
+              <a:t>4/19/24</a:t>
             </a:fld>
             <a:endParaRPr lang="en-US"/>
           </a:p>
@@ -1721,7 +1727,7 @@
           <a:p>
             <a:fld id="{536E8168-2CAE-334E-A057-B1B8C2D249B0}" type="datetimeFigureOut">
               <a:rPr lang="en-US" smtClean="0"/>
-              <a:t>4/18/24</a:t>
+              <a:t>4/19/24</a:t>
             </a:fld>
             <a:endParaRPr lang="en-US"/>
           </a:p>
@@ -1816,7 +1822,7 @@
           <a:p>
             <a:fld id="{536E8168-2CAE-334E-A057-B1B8C2D249B0}" type="datetimeFigureOut">
               <a:rPr lang="en-US" smtClean="0"/>
-              <a:t>4/18/24</a:t>
+              <a:t>4/19/24</a:t>
             </a:fld>
             <a:endParaRPr lang="en-US"/>
           </a:p>
@@ -2093,7 +2099,7 @@
           <a:p>
             <a:fld id="{536E8168-2CAE-334E-A057-B1B8C2D249B0}" type="datetimeFigureOut">
               <a:rPr lang="en-US" smtClean="0"/>
-              <a:t>4/18/24</a:t>
+              <a:t>4/19/24</a:t>
             </a:fld>
             <a:endParaRPr lang="en-US"/>
           </a:p>
@@ -2350,7 +2356,7 @@
           <a:p>
             <a:fld id="{536E8168-2CAE-334E-A057-B1B8C2D249B0}" type="datetimeFigureOut">
               <a:rPr lang="en-US" smtClean="0"/>
-              <a:t>4/18/24</a:t>
+              <a:t>4/19/24</a:t>
             </a:fld>
             <a:endParaRPr lang="en-US"/>
           </a:p>
@@ -2563,7 +2569,7 @@
           <a:p>
             <a:fld id="{536E8168-2CAE-334E-A057-B1B8C2D249B0}" type="datetimeFigureOut">
               <a:rPr lang="en-US" smtClean="0"/>
-              <a:t>4/18/24</a:t>
+              <a:t>4/19/24</a:t>
             </a:fld>
             <a:endParaRPr lang="en-US"/>
           </a:p>
@@ -2952,6 +2958,1868 @@
 </file>
 
 <file path=ppt/slides/slide1.xml><?xml version="1.0" encoding="utf-8"?>
+<p:sld xmlns:a="http://schemas.openxmlformats.org/drawingml/2006/main" xmlns:r="http://schemas.openxmlformats.org/officeDocument/2006/relationships" xmlns:p="http://schemas.openxmlformats.org/presentationml/2006/main">
+  <p:cSld>
+    <p:spTree>
+      <p:nvGrpSpPr>
+        <p:cNvPr id="1" name=""/>
+        <p:cNvGrpSpPr/>
+        <p:nvPr/>
+      </p:nvGrpSpPr>
+      <p:grpSpPr>
+        <a:xfrm>
+          <a:off x="0" y="0"/>
+          <a:ext cx="0" cy="0"/>
+          <a:chOff x="0" y="0"/>
+          <a:chExt cx="0" cy="0"/>
+        </a:xfrm>
+      </p:grpSpPr>
+      <p:grpSp>
+        <p:nvGrpSpPr>
+          <p:cNvPr id="38" name="Group 37">
+            <a:extLst>
+              <a:ext uri="{FF2B5EF4-FFF2-40B4-BE49-F238E27FC236}">
+                <a16:creationId xmlns:a16="http://schemas.microsoft.com/office/drawing/2014/main" id="{84BE5F0B-C762-B5EF-7DAB-7BD0B1B8CAEF}"/>
+              </a:ext>
+            </a:extLst>
+          </p:cNvPr>
+          <p:cNvGrpSpPr/>
+          <p:nvPr/>
+        </p:nvGrpSpPr>
+        <p:grpSpPr>
+          <a:xfrm>
+            <a:off x="127750" y="0"/>
+            <a:ext cx="12018137" cy="4803199"/>
+            <a:chOff x="127750" y="0"/>
+            <a:chExt cx="12018137" cy="4803199"/>
+          </a:xfrm>
+        </p:grpSpPr>
+        <p:sp>
+          <p:nvSpPr>
+            <p:cNvPr id="4" name="Rectangle 3">
+              <a:extLst>
+                <a:ext uri="{FF2B5EF4-FFF2-40B4-BE49-F238E27FC236}">
+                  <a16:creationId xmlns:a16="http://schemas.microsoft.com/office/drawing/2014/main" id="{8E53F1EA-CC34-C318-4C24-E0B51CB55524}"/>
+                </a:ext>
+              </a:extLst>
+            </p:cNvPr>
+            <p:cNvSpPr/>
+            <p:nvPr/>
+          </p:nvSpPr>
+          <p:spPr>
+            <a:xfrm>
+              <a:off x="127750" y="807752"/>
+              <a:ext cx="3679514" cy="2675128"/>
+            </a:xfrm>
+            <a:prstGeom prst="rect">
+              <a:avLst/>
+            </a:prstGeom>
+            <a:noFill/>
+            <a:ln>
+              <a:solidFill>
+                <a:schemeClr val="accent1"/>
+              </a:solidFill>
+            </a:ln>
+          </p:spPr>
+          <p:style>
+            <a:lnRef idx="2">
+              <a:schemeClr val="accent6"/>
+            </a:lnRef>
+            <a:fillRef idx="1">
+              <a:schemeClr val="lt1"/>
+            </a:fillRef>
+            <a:effectRef idx="0">
+              <a:schemeClr val="accent6"/>
+            </a:effectRef>
+            <a:fontRef idx="minor">
+              <a:schemeClr val="dk1"/>
+            </a:fontRef>
+          </p:style>
+          <p:txBody>
+            <a:bodyPr rtlCol="0" anchor="ctr"/>
+            <a:lstStyle/>
+            <a:p>
+              <a:pPr algn="ctr"/>
+              <a:endParaRPr lang="en-US" sz="1600" dirty="0"/>
+            </a:p>
+            <a:p>
+              <a:pPr algn="ctr"/>
+              <a:endParaRPr lang="en-US" sz="1600" dirty="0"/>
+            </a:p>
+            <a:p>
+              <a:pPr algn="ctr"/>
+              <a:endParaRPr lang="en-US" sz="1600" dirty="0"/>
+            </a:p>
+          </p:txBody>
+        </p:sp>
+        <p:sp>
+          <p:nvSpPr>
+            <p:cNvPr id="5" name="Rectangle 4">
+              <a:extLst>
+                <a:ext uri="{FF2B5EF4-FFF2-40B4-BE49-F238E27FC236}">
+                  <a16:creationId xmlns:a16="http://schemas.microsoft.com/office/drawing/2014/main" id="{D8348979-62BD-B757-1B64-76132A97EEE2}"/>
+                </a:ext>
+              </a:extLst>
+            </p:cNvPr>
+            <p:cNvSpPr/>
+            <p:nvPr/>
+          </p:nvSpPr>
+          <p:spPr>
+            <a:xfrm>
+              <a:off x="4740368" y="463463"/>
+              <a:ext cx="6021697" cy="4339736"/>
+            </a:xfrm>
+            <a:prstGeom prst="rect">
+              <a:avLst/>
+            </a:prstGeom>
+            <a:noFill/>
+            <a:ln>
+              <a:solidFill>
+                <a:schemeClr val="accent1"/>
+              </a:solidFill>
+            </a:ln>
+          </p:spPr>
+          <p:style>
+            <a:lnRef idx="2">
+              <a:schemeClr val="accent6"/>
+            </a:lnRef>
+            <a:fillRef idx="1">
+              <a:schemeClr val="lt1"/>
+            </a:fillRef>
+            <a:effectRef idx="0">
+              <a:schemeClr val="accent6"/>
+            </a:effectRef>
+            <a:fontRef idx="minor">
+              <a:schemeClr val="dk1"/>
+            </a:fontRef>
+          </p:style>
+          <p:txBody>
+            <a:bodyPr rtlCol="0" anchor="ctr"/>
+            <a:lstStyle/>
+            <a:p>
+              <a:br>
+                <a:rPr lang="en-US" sz="1600" dirty="0"/>
+              </a:br>
+              <a:endParaRPr lang="en-US" sz="1600" dirty="0">
+                <a:solidFill>
+                  <a:srgbClr val="000000"/>
+                </a:solidFill>
+                <a:latin typeface="Georgia" panose="02040502050405020303" pitchFamily="18" charset="0"/>
+              </a:endParaRPr>
+            </a:p>
+            <a:p>
+              <a:endParaRPr lang="en-US" sz="1600" dirty="0">
+                <a:solidFill>
+                  <a:srgbClr val="000000"/>
+                </a:solidFill>
+                <a:latin typeface="Georgia" panose="02040502050405020303" pitchFamily="18" charset="0"/>
+              </a:endParaRPr>
+            </a:p>
+            <a:p>
+              <a:endParaRPr lang="en-US" sz="1600" dirty="0">
+                <a:solidFill>
+                  <a:srgbClr val="000000"/>
+                </a:solidFill>
+                <a:latin typeface="Georgia" panose="02040502050405020303" pitchFamily="18" charset="0"/>
+              </a:endParaRPr>
+            </a:p>
+            <a:p>
+              <a:endParaRPr lang="en-US" sz="1600" dirty="0">
+                <a:solidFill>
+                  <a:srgbClr val="000000"/>
+                </a:solidFill>
+                <a:latin typeface="Georgia" panose="02040502050405020303" pitchFamily="18" charset="0"/>
+              </a:endParaRPr>
+            </a:p>
+            <a:p>
+              <a:br>
+                <a:rPr lang="en-US" sz="1600" dirty="0"/>
+              </a:br>
+              <a:endParaRPr lang="en-US" sz="1600" dirty="0"/>
+            </a:p>
+          </p:txBody>
+        </p:sp>
+        <p:sp>
+          <p:nvSpPr>
+            <p:cNvPr id="6" name="Rectangle 5">
+              <a:extLst>
+                <a:ext uri="{FF2B5EF4-FFF2-40B4-BE49-F238E27FC236}">
+                  <a16:creationId xmlns:a16="http://schemas.microsoft.com/office/drawing/2014/main" id="{B793B264-9BFD-FAA2-2AE9-46ECC1F2E666}"/>
+                </a:ext>
+              </a:extLst>
+            </p:cNvPr>
+            <p:cNvSpPr/>
+            <p:nvPr/>
+          </p:nvSpPr>
+          <p:spPr>
+            <a:xfrm>
+              <a:off x="6816690" y="704152"/>
+              <a:ext cx="3671733" cy="3855957"/>
+            </a:xfrm>
+            <a:prstGeom prst="rect">
+              <a:avLst/>
+            </a:prstGeom>
+            <a:noFill/>
+            <a:ln>
+              <a:solidFill>
+                <a:schemeClr val="tx1"/>
+              </a:solidFill>
+            </a:ln>
+          </p:spPr>
+          <p:style>
+            <a:lnRef idx="2">
+              <a:schemeClr val="accent6"/>
+            </a:lnRef>
+            <a:fillRef idx="1">
+              <a:schemeClr val="lt1"/>
+            </a:fillRef>
+            <a:effectRef idx="0">
+              <a:schemeClr val="accent6"/>
+            </a:effectRef>
+            <a:fontRef idx="minor">
+              <a:schemeClr val="dk1"/>
+            </a:fontRef>
+          </p:style>
+          <p:txBody>
+            <a:bodyPr rtlCol="0" anchor="ctr"/>
+            <a:lstStyle/>
+            <a:p>
+              <a:pPr algn="r"/>
+              <a:endParaRPr lang="en-US" sz="1600" dirty="0"/>
+            </a:p>
+            <a:p>
+              <a:pPr algn="r"/>
+              <a:endParaRPr lang="en-US" sz="1600" dirty="0"/>
+            </a:p>
+            <a:p>
+              <a:pPr algn="r"/>
+              <a:endParaRPr lang="en-US" sz="1600" dirty="0"/>
+            </a:p>
+          </p:txBody>
+        </p:sp>
+        <p:sp>
+          <p:nvSpPr>
+            <p:cNvPr id="7" name="Folded Corner 6">
+              <a:extLst>
+                <a:ext uri="{FF2B5EF4-FFF2-40B4-BE49-F238E27FC236}">
+                  <a16:creationId xmlns:a16="http://schemas.microsoft.com/office/drawing/2014/main" id="{F7ED0FE1-0AF9-2D4C-18CC-9290C480D9C7}"/>
+                </a:ext>
+              </a:extLst>
+            </p:cNvPr>
+            <p:cNvSpPr/>
+            <p:nvPr/>
+          </p:nvSpPr>
+          <p:spPr>
+            <a:xfrm>
+              <a:off x="7121372" y="2000650"/>
+              <a:ext cx="1572854" cy="979116"/>
+            </a:xfrm>
+            <a:prstGeom prst="foldedCorner">
+              <a:avLst>
+                <a:gd name="adj" fmla="val 20016"/>
+              </a:avLst>
+            </a:prstGeom>
+            <a:solidFill>
+              <a:schemeClr val="accent4">
+                <a:lumMod val="40000"/>
+                <a:lumOff val="60000"/>
+              </a:schemeClr>
+            </a:solidFill>
+            <a:ln>
+              <a:solidFill>
+                <a:schemeClr val="tx1"/>
+              </a:solidFill>
+            </a:ln>
+          </p:spPr>
+          <p:style>
+            <a:lnRef idx="2">
+              <a:schemeClr val="accent6"/>
+            </a:lnRef>
+            <a:fillRef idx="1">
+              <a:schemeClr val="lt1"/>
+            </a:fillRef>
+            <a:effectRef idx="0">
+              <a:schemeClr val="accent6"/>
+            </a:effectRef>
+            <a:fontRef idx="minor">
+              <a:schemeClr val="dk1"/>
+            </a:fontRef>
+          </p:style>
+          <p:txBody>
+            <a:bodyPr rtlCol="0" anchor="ctr"/>
+            <a:lstStyle/>
+            <a:p>
+              <a:pPr algn="ctr"/>
+              <a:r>
+                <a:rPr lang="en-US" sz="1600" dirty="0">
+                  <a:solidFill>
+                    <a:schemeClr val="tx1"/>
+                  </a:solidFill>
+                  <a:latin typeface="Georgia" panose="02040502050405020303" pitchFamily="18" charset="0"/>
+                </a:rPr>
+                <a:t>Safe Program</a:t>
+              </a:r>
+            </a:p>
+          </p:txBody>
+        </p:sp>
+        <p:sp>
+          <p:nvSpPr>
+            <p:cNvPr id="8" name="Rectangle 7">
+              <a:extLst>
+                <a:ext uri="{FF2B5EF4-FFF2-40B4-BE49-F238E27FC236}">
+                  <a16:creationId xmlns:a16="http://schemas.microsoft.com/office/drawing/2014/main" id="{AEDB0ACB-26B4-15FB-F770-A83CAD9C408A}"/>
+                </a:ext>
+              </a:extLst>
+            </p:cNvPr>
+            <p:cNvSpPr/>
+            <p:nvPr/>
+          </p:nvSpPr>
+          <p:spPr>
+            <a:xfrm>
+              <a:off x="10934796" y="1327711"/>
+              <a:ext cx="1186837" cy="990147"/>
+            </a:xfrm>
+            <a:prstGeom prst="rect">
+              <a:avLst/>
+            </a:prstGeom>
+            <a:solidFill>
+              <a:srgbClr val="FFFD78">
+                <a:alpha val="50041"/>
+              </a:srgbClr>
+            </a:solidFill>
+            <a:ln>
+              <a:solidFill>
+                <a:schemeClr val="tx1"/>
+              </a:solidFill>
+            </a:ln>
+          </p:spPr>
+          <p:style>
+            <a:lnRef idx="2">
+              <a:schemeClr val="accent6"/>
+            </a:lnRef>
+            <a:fillRef idx="1">
+              <a:schemeClr val="lt1"/>
+            </a:fillRef>
+            <a:effectRef idx="0">
+              <a:schemeClr val="accent6"/>
+            </a:effectRef>
+            <a:fontRef idx="minor">
+              <a:schemeClr val="dk1"/>
+            </a:fontRef>
+          </p:style>
+          <p:txBody>
+            <a:bodyPr rtlCol="0" anchor="ctr"/>
+            <a:lstStyle/>
+            <a:p>
+              <a:pPr algn="ctr"/>
+              <a:r>
+                <a:rPr lang="en-US" sz="1600" dirty="0" err="1">
+                  <a:latin typeface="Georgia" panose="02040502050405020303" pitchFamily="18" charset="0"/>
+                </a:rPr>
+                <a:t>eBPF</a:t>
+              </a:r>
+              <a:r>
+                <a:rPr lang="en-US" sz="1600" dirty="0">
+                  <a:latin typeface="Georgia" panose="02040502050405020303" pitchFamily="18" charset="0"/>
+                </a:rPr>
+                <a:t> Maps</a:t>
+              </a:r>
+            </a:p>
+          </p:txBody>
+        </p:sp>
+        <p:sp>
+          <p:nvSpPr>
+            <p:cNvPr id="9" name="Rectangle 8">
+              <a:extLst>
+                <a:ext uri="{FF2B5EF4-FFF2-40B4-BE49-F238E27FC236}">
+                  <a16:creationId xmlns:a16="http://schemas.microsoft.com/office/drawing/2014/main" id="{A47FE5C7-1DA9-8D64-9BC6-1D84710E00CA}"/>
+                </a:ext>
+              </a:extLst>
+            </p:cNvPr>
+            <p:cNvSpPr/>
+            <p:nvPr/>
+          </p:nvSpPr>
+          <p:spPr>
+            <a:xfrm>
+              <a:off x="10959050" y="2979764"/>
+              <a:ext cx="1186837" cy="990147"/>
+            </a:xfrm>
+            <a:prstGeom prst="rect">
+              <a:avLst/>
+            </a:prstGeom>
+            <a:solidFill>
+              <a:srgbClr val="FFFD78">
+                <a:alpha val="50000"/>
+              </a:srgbClr>
+            </a:solidFill>
+            <a:ln>
+              <a:solidFill>
+                <a:schemeClr val="tx1"/>
+              </a:solidFill>
+            </a:ln>
+          </p:spPr>
+          <p:style>
+            <a:lnRef idx="2">
+              <a:schemeClr val="accent6"/>
+            </a:lnRef>
+            <a:fillRef idx="1">
+              <a:schemeClr val="lt1"/>
+            </a:fillRef>
+            <a:effectRef idx="0">
+              <a:schemeClr val="accent6"/>
+            </a:effectRef>
+            <a:fontRef idx="minor">
+              <a:schemeClr val="dk1"/>
+            </a:fontRef>
+          </p:style>
+          <p:txBody>
+            <a:bodyPr rtlCol="0" anchor="ctr"/>
+            <a:lstStyle/>
+            <a:p>
+              <a:pPr algn="ctr"/>
+              <a:r>
+                <a:rPr lang="en-US" sz="1600" dirty="0">
+                  <a:latin typeface="Georgia" panose="02040502050405020303" pitchFamily="18" charset="0"/>
+                </a:rPr>
+                <a:t>Helper Functions</a:t>
+              </a:r>
+            </a:p>
+          </p:txBody>
+        </p:sp>
+        <p:sp>
+          <p:nvSpPr>
+            <p:cNvPr id="10" name="Rectangle 9">
+              <a:extLst>
+                <a:ext uri="{FF2B5EF4-FFF2-40B4-BE49-F238E27FC236}">
+                  <a16:creationId xmlns:a16="http://schemas.microsoft.com/office/drawing/2014/main" id="{D27A4B50-9DF6-7580-9FC5-CD98C1B1827E}"/>
+                </a:ext>
+              </a:extLst>
+            </p:cNvPr>
+            <p:cNvSpPr/>
+            <p:nvPr/>
+          </p:nvSpPr>
+          <p:spPr>
+            <a:xfrm rot="5400000">
+              <a:off x="8121406" y="2199698"/>
+              <a:ext cx="3297531" cy="864867"/>
+            </a:xfrm>
+            <a:prstGeom prst="rect">
+              <a:avLst/>
+            </a:prstGeom>
+            <a:solidFill>
+              <a:schemeClr val="accent5">
+                <a:lumMod val="20000"/>
+                <a:lumOff val="80000"/>
+              </a:schemeClr>
+            </a:solidFill>
+            <a:ln>
+              <a:solidFill>
+                <a:schemeClr val="tx1"/>
+              </a:solidFill>
+            </a:ln>
+          </p:spPr>
+          <p:style>
+            <a:lnRef idx="2">
+              <a:schemeClr val="accent6"/>
+            </a:lnRef>
+            <a:fillRef idx="1">
+              <a:schemeClr val="lt1"/>
+            </a:fillRef>
+            <a:effectRef idx="0">
+              <a:schemeClr val="accent6"/>
+            </a:effectRef>
+            <a:fontRef idx="minor">
+              <a:schemeClr val="dk1"/>
+            </a:fontRef>
+          </p:style>
+          <p:txBody>
+            <a:bodyPr rtlCol="0" anchor="ctr"/>
+            <a:lstStyle/>
+            <a:p>
+              <a:pPr algn="ctr"/>
+              <a:r>
+                <a:rPr lang="en-US" sz="1600" dirty="0">
+                  <a:latin typeface="Georgia" panose="02040502050405020303" pitchFamily="18" charset="0"/>
+                </a:rPr>
+                <a:t>Extension Program Interface</a:t>
+              </a:r>
+            </a:p>
+          </p:txBody>
+        </p:sp>
+        <p:sp>
+          <p:nvSpPr>
+            <p:cNvPr id="11" name="TextBox 10">
+              <a:extLst>
+                <a:ext uri="{FF2B5EF4-FFF2-40B4-BE49-F238E27FC236}">
+                  <a16:creationId xmlns:a16="http://schemas.microsoft.com/office/drawing/2014/main" id="{2204031B-7B2A-87AF-D7D5-A2DF7B803068}"/>
+                </a:ext>
+              </a:extLst>
+            </p:cNvPr>
+            <p:cNvSpPr txBox="1"/>
+            <p:nvPr/>
+          </p:nvSpPr>
+          <p:spPr>
+            <a:xfrm>
+              <a:off x="7121369" y="832391"/>
+              <a:ext cx="1572854" cy="584775"/>
+            </a:xfrm>
+            <a:prstGeom prst="rect">
+              <a:avLst/>
+            </a:prstGeom>
+            <a:noFill/>
+          </p:spPr>
+          <p:txBody>
+            <a:bodyPr wrap="square" rtlCol="0">
+              <a:spAutoFit/>
+            </a:bodyPr>
+            <a:lstStyle/>
+            <a:p>
+              <a:pPr algn="ctr"/>
+              <a:r>
+                <a:rPr lang="en-US" sz="1600" dirty="0">
+                  <a:latin typeface="Georgia" panose="02040502050405020303" pitchFamily="18" charset="0"/>
+                </a:rPr>
+                <a:t>Kernel</a:t>
+              </a:r>
+            </a:p>
+            <a:p>
+              <a:pPr algn="ctr"/>
+              <a:r>
+                <a:rPr lang="en-US" sz="1600" dirty="0">
+                  <a:latin typeface="Georgia" panose="02040502050405020303" pitchFamily="18" charset="0"/>
+                </a:rPr>
+                <a:t>Crate</a:t>
+              </a:r>
+            </a:p>
+          </p:txBody>
+        </p:sp>
+        <p:sp>
+          <p:nvSpPr>
+            <p:cNvPr id="12" name="Rectangle 11">
+              <a:extLst>
+                <a:ext uri="{FF2B5EF4-FFF2-40B4-BE49-F238E27FC236}">
+                  <a16:creationId xmlns:a16="http://schemas.microsoft.com/office/drawing/2014/main" id="{85980E11-2378-019F-F368-DF6420A75821}"/>
+                </a:ext>
+              </a:extLst>
+            </p:cNvPr>
+            <p:cNvSpPr/>
+            <p:nvPr/>
+          </p:nvSpPr>
+          <p:spPr>
+            <a:xfrm>
+              <a:off x="7121372" y="3434537"/>
+              <a:ext cx="1572854" cy="846361"/>
+            </a:xfrm>
+            <a:prstGeom prst="rect">
+              <a:avLst/>
+            </a:prstGeom>
+            <a:solidFill>
+              <a:schemeClr val="accent5">
+                <a:lumMod val="20000"/>
+                <a:lumOff val="80000"/>
+              </a:schemeClr>
+            </a:solidFill>
+            <a:ln>
+              <a:solidFill>
+                <a:schemeClr val="tx1"/>
+              </a:solidFill>
+            </a:ln>
+          </p:spPr>
+          <p:style>
+            <a:lnRef idx="2">
+              <a:schemeClr val="accent6"/>
+            </a:lnRef>
+            <a:fillRef idx="1">
+              <a:schemeClr val="lt1"/>
+            </a:fillRef>
+            <a:effectRef idx="0">
+              <a:schemeClr val="accent6"/>
+            </a:effectRef>
+            <a:fontRef idx="minor">
+              <a:schemeClr val="dk1"/>
+            </a:fontRef>
+          </p:style>
+          <p:txBody>
+            <a:bodyPr rtlCol="0" anchor="ctr"/>
+            <a:lstStyle/>
+            <a:p>
+              <a:pPr algn="ctr"/>
+              <a:r>
+                <a:rPr lang="en-US" sz="1600" dirty="0">
+                  <a:latin typeface="Georgia" panose="02040502050405020303" pitchFamily="18" charset="0"/>
+                </a:rPr>
+                <a:t>Panic</a:t>
+              </a:r>
+            </a:p>
+            <a:p>
+              <a:pPr algn="ctr"/>
+              <a:r>
+                <a:rPr lang="en-US" sz="1600" dirty="0">
+                  <a:latin typeface="Georgia" panose="02040502050405020303" pitchFamily="18" charset="0"/>
+                </a:rPr>
+                <a:t>Handler</a:t>
+              </a:r>
+            </a:p>
+          </p:txBody>
+        </p:sp>
+        <p:sp>
+          <p:nvSpPr>
+            <p:cNvPr id="13" name="Rectangle 12">
+              <a:extLst>
+                <a:ext uri="{FF2B5EF4-FFF2-40B4-BE49-F238E27FC236}">
+                  <a16:creationId xmlns:a16="http://schemas.microsoft.com/office/drawing/2014/main" id="{9A4CD7E7-86AB-FD0B-0BE0-BAC6697DC190}"/>
+                </a:ext>
+              </a:extLst>
+            </p:cNvPr>
+            <p:cNvSpPr/>
+            <p:nvPr/>
+          </p:nvSpPr>
+          <p:spPr>
+            <a:xfrm>
+              <a:off x="3697727" y="3824083"/>
+              <a:ext cx="763473" cy="979116"/>
+            </a:xfrm>
+            <a:prstGeom prst="rect">
+              <a:avLst/>
+            </a:prstGeom>
+            <a:solidFill>
+              <a:schemeClr val="bg1">
+                <a:lumMod val="85000"/>
+              </a:schemeClr>
+            </a:solidFill>
+            <a:ln>
+              <a:solidFill>
+                <a:schemeClr val="tx1"/>
+              </a:solidFill>
+            </a:ln>
+          </p:spPr>
+          <p:style>
+            <a:lnRef idx="2">
+              <a:schemeClr val="accent6"/>
+            </a:lnRef>
+            <a:fillRef idx="1">
+              <a:schemeClr val="lt1"/>
+            </a:fillRef>
+            <a:effectRef idx="0">
+              <a:schemeClr val="accent6"/>
+            </a:effectRef>
+            <a:fontRef idx="minor">
+              <a:schemeClr val="dk1"/>
+            </a:fontRef>
+          </p:style>
+          <p:txBody>
+            <a:bodyPr rtlCol="0" anchor="ctr"/>
+            <a:lstStyle/>
+            <a:p>
+              <a:pPr algn="ctr"/>
+              <a:r>
+                <a:rPr lang="en-US" sz="1600" dirty="0">
+                  <a:latin typeface="Georgia" panose="02040502050405020303" pitchFamily="18" charset="0"/>
+                </a:rPr>
+                <a:t>Hook</a:t>
+              </a:r>
+            </a:p>
+            <a:p>
+              <a:pPr algn="ctr"/>
+              <a:r>
+                <a:rPr lang="en-US" sz="1600" dirty="0">
+                  <a:latin typeface="Georgia" panose="02040502050405020303" pitchFamily="18" charset="0"/>
+                </a:rPr>
+                <a:t>point</a:t>
+              </a:r>
+            </a:p>
+          </p:txBody>
+        </p:sp>
+        <p:cxnSp>
+          <p:nvCxnSpPr>
+            <p:cNvPr id="14" name="Straight Arrow Connector 13">
+              <a:extLst>
+                <a:ext uri="{FF2B5EF4-FFF2-40B4-BE49-F238E27FC236}">
+                  <a16:creationId xmlns:a16="http://schemas.microsoft.com/office/drawing/2014/main" id="{45DEBE36-60B1-CC5A-A4E9-D9A15A3C86EC}"/>
+                </a:ext>
+              </a:extLst>
+            </p:cNvPr>
+            <p:cNvCxnSpPr>
+              <a:cxnSpLocks/>
+            </p:cNvCxnSpPr>
+            <p:nvPr/>
+          </p:nvCxnSpPr>
+          <p:spPr>
+            <a:xfrm>
+              <a:off x="8694227" y="2268337"/>
+              <a:ext cx="643509" cy="0"/>
+            </a:xfrm>
+            <a:prstGeom prst="straightConnector1">
+              <a:avLst/>
+            </a:prstGeom>
+            <a:ln w="25400">
+              <a:solidFill>
+                <a:schemeClr val="tx1"/>
+              </a:solidFill>
+              <a:tailEnd type="triangle"/>
+            </a:ln>
+          </p:spPr>
+          <p:style>
+            <a:lnRef idx="2">
+              <a:schemeClr val="accent1"/>
+            </a:lnRef>
+            <a:fillRef idx="0">
+              <a:schemeClr val="accent1"/>
+            </a:fillRef>
+            <a:effectRef idx="1">
+              <a:schemeClr val="accent1"/>
+            </a:effectRef>
+            <a:fontRef idx="minor">
+              <a:schemeClr val="tx1"/>
+            </a:fontRef>
+          </p:style>
+        </p:cxnSp>
+        <p:cxnSp>
+          <p:nvCxnSpPr>
+            <p:cNvPr id="15" name="Straight Arrow Connector 14">
+              <a:extLst>
+                <a:ext uri="{FF2B5EF4-FFF2-40B4-BE49-F238E27FC236}">
+                  <a16:creationId xmlns:a16="http://schemas.microsoft.com/office/drawing/2014/main" id="{2024D108-A8EE-2AA7-BAB9-BC8F713D4815}"/>
+                </a:ext>
+              </a:extLst>
+            </p:cNvPr>
+            <p:cNvCxnSpPr>
+              <a:cxnSpLocks/>
+            </p:cNvCxnSpPr>
+            <p:nvPr/>
+          </p:nvCxnSpPr>
+          <p:spPr>
+            <a:xfrm flipH="1" flipV="1">
+              <a:off x="8694225" y="2623269"/>
+              <a:ext cx="643510" cy="0"/>
+            </a:xfrm>
+            <a:prstGeom prst="straightConnector1">
+              <a:avLst/>
+            </a:prstGeom>
+            <a:ln w="25400">
+              <a:solidFill>
+                <a:schemeClr val="tx1"/>
+              </a:solidFill>
+              <a:tailEnd type="triangle"/>
+            </a:ln>
+          </p:spPr>
+          <p:style>
+            <a:lnRef idx="2">
+              <a:schemeClr val="accent1"/>
+            </a:lnRef>
+            <a:fillRef idx="0">
+              <a:schemeClr val="accent1"/>
+            </a:fillRef>
+            <a:effectRef idx="1">
+              <a:schemeClr val="accent1"/>
+            </a:effectRef>
+            <a:fontRef idx="minor">
+              <a:schemeClr val="tx1"/>
+            </a:fontRef>
+          </p:style>
+        </p:cxnSp>
+        <p:cxnSp>
+          <p:nvCxnSpPr>
+            <p:cNvPr id="16" name="Straight Arrow Connector 15">
+              <a:extLst>
+                <a:ext uri="{FF2B5EF4-FFF2-40B4-BE49-F238E27FC236}">
+                  <a16:creationId xmlns:a16="http://schemas.microsoft.com/office/drawing/2014/main" id="{DFB0BA51-FCC8-8439-2E65-B38448F1AC66}"/>
+                </a:ext>
+              </a:extLst>
+            </p:cNvPr>
+            <p:cNvCxnSpPr>
+              <a:cxnSpLocks/>
+            </p:cNvCxnSpPr>
+            <p:nvPr/>
+          </p:nvCxnSpPr>
+          <p:spPr>
+            <a:xfrm>
+              <a:off x="10202603" y="1536798"/>
+              <a:ext cx="732193" cy="0"/>
+            </a:xfrm>
+            <a:prstGeom prst="straightConnector1">
+              <a:avLst/>
+            </a:prstGeom>
+            <a:ln w="25400">
+              <a:solidFill>
+                <a:schemeClr val="tx1"/>
+              </a:solidFill>
+              <a:tailEnd type="triangle"/>
+            </a:ln>
+          </p:spPr>
+          <p:style>
+            <a:lnRef idx="2">
+              <a:schemeClr val="accent1"/>
+            </a:lnRef>
+            <a:fillRef idx="0">
+              <a:schemeClr val="accent1"/>
+            </a:fillRef>
+            <a:effectRef idx="1">
+              <a:schemeClr val="accent1"/>
+            </a:effectRef>
+            <a:fontRef idx="minor">
+              <a:schemeClr val="tx1"/>
+            </a:fontRef>
+          </p:style>
+        </p:cxnSp>
+        <p:cxnSp>
+          <p:nvCxnSpPr>
+            <p:cNvPr id="17" name="Straight Arrow Connector 16">
+              <a:extLst>
+                <a:ext uri="{FF2B5EF4-FFF2-40B4-BE49-F238E27FC236}">
+                  <a16:creationId xmlns:a16="http://schemas.microsoft.com/office/drawing/2014/main" id="{92BB1C8B-5D7E-F28C-4698-F7C7A77BAE3F}"/>
+                </a:ext>
+              </a:extLst>
+            </p:cNvPr>
+            <p:cNvCxnSpPr>
+              <a:cxnSpLocks/>
+            </p:cNvCxnSpPr>
+            <p:nvPr/>
+          </p:nvCxnSpPr>
+          <p:spPr>
+            <a:xfrm flipH="1">
+              <a:off x="10202603" y="2000649"/>
+              <a:ext cx="732193" cy="0"/>
+            </a:xfrm>
+            <a:prstGeom prst="straightConnector1">
+              <a:avLst/>
+            </a:prstGeom>
+            <a:ln w="25400">
+              <a:solidFill>
+                <a:schemeClr val="tx1"/>
+              </a:solidFill>
+              <a:tailEnd type="triangle"/>
+            </a:ln>
+          </p:spPr>
+          <p:style>
+            <a:lnRef idx="2">
+              <a:schemeClr val="accent1"/>
+            </a:lnRef>
+            <a:fillRef idx="0">
+              <a:schemeClr val="accent1"/>
+            </a:fillRef>
+            <a:effectRef idx="1">
+              <a:schemeClr val="accent1"/>
+            </a:effectRef>
+            <a:fontRef idx="minor">
+              <a:schemeClr val="tx1"/>
+            </a:fontRef>
+          </p:style>
+        </p:cxnSp>
+        <p:cxnSp>
+          <p:nvCxnSpPr>
+            <p:cNvPr id="18" name="Straight Arrow Connector 17">
+              <a:extLst>
+                <a:ext uri="{FF2B5EF4-FFF2-40B4-BE49-F238E27FC236}">
+                  <a16:creationId xmlns:a16="http://schemas.microsoft.com/office/drawing/2014/main" id="{D5BBC81F-3006-F905-B4F0-83F9F02D922C}"/>
+                </a:ext>
+              </a:extLst>
+            </p:cNvPr>
+            <p:cNvCxnSpPr>
+              <a:cxnSpLocks/>
+            </p:cNvCxnSpPr>
+            <p:nvPr/>
+          </p:nvCxnSpPr>
+          <p:spPr>
+            <a:xfrm>
+              <a:off x="10202603" y="3269644"/>
+              <a:ext cx="756447" cy="0"/>
+            </a:xfrm>
+            <a:prstGeom prst="straightConnector1">
+              <a:avLst/>
+            </a:prstGeom>
+            <a:ln w="25400">
+              <a:solidFill>
+                <a:schemeClr val="tx1"/>
+              </a:solidFill>
+              <a:tailEnd type="triangle"/>
+            </a:ln>
+          </p:spPr>
+          <p:style>
+            <a:lnRef idx="2">
+              <a:schemeClr val="accent1"/>
+            </a:lnRef>
+            <a:fillRef idx="0">
+              <a:schemeClr val="accent1"/>
+            </a:fillRef>
+            <a:effectRef idx="1">
+              <a:schemeClr val="accent1"/>
+            </a:effectRef>
+            <a:fontRef idx="minor">
+              <a:schemeClr val="tx1"/>
+            </a:fontRef>
+          </p:style>
+        </p:cxnSp>
+        <p:cxnSp>
+          <p:nvCxnSpPr>
+            <p:cNvPr id="19" name="Straight Arrow Connector 18">
+              <a:extLst>
+                <a:ext uri="{FF2B5EF4-FFF2-40B4-BE49-F238E27FC236}">
+                  <a16:creationId xmlns:a16="http://schemas.microsoft.com/office/drawing/2014/main" id="{46976378-39B4-3CF6-E469-2236317AFDBF}"/>
+                </a:ext>
+              </a:extLst>
+            </p:cNvPr>
+            <p:cNvCxnSpPr>
+              <a:cxnSpLocks/>
+            </p:cNvCxnSpPr>
+            <p:nvPr/>
+          </p:nvCxnSpPr>
+          <p:spPr>
+            <a:xfrm flipH="1">
+              <a:off x="10202603" y="3709510"/>
+              <a:ext cx="756447" cy="0"/>
+            </a:xfrm>
+            <a:prstGeom prst="straightConnector1">
+              <a:avLst/>
+            </a:prstGeom>
+            <a:ln w="25400">
+              <a:solidFill>
+                <a:schemeClr val="tx1"/>
+              </a:solidFill>
+              <a:tailEnd type="triangle"/>
+            </a:ln>
+          </p:spPr>
+          <p:style>
+            <a:lnRef idx="2">
+              <a:schemeClr val="accent1"/>
+            </a:lnRef>
+            <a:fillRef idx="0">
+              <a:schemeClr val="accent1"/>
+            </a:fillRef>
+            <a:effectRef idx="1">
+              <a:schemeClr val="accent1"/>
+            </a:effectRef>
+            <a:fontRef idx="minor">
+              <a:schemeClr val="tx1"/>
+            </a:fontRef>
+          </p:style>
+        </p:cxnSp>
+        <p:cxnSp>
+          <p:nvCxnSpPr>
+            <p:cNvPr id="20" name="Straight Arrow Connector 19">
+              <a:extLst>
+                <a:ext uri="{FF2B5EF4-FFF2-40B4-BE49-F238E27FC236}">
+                  <a16:creationId xmlns:a16="http://schemas.microsoft.com/office/drawing/2014/main" id="{8C03F022-1030-7402-1B79-D28746BDAF47}"/>
+                </a:ext>
+              </a:extLst>
+            </p:cNvPr>
+            <p:cNvCxnSpPr>
+              <a:stCxn id="7" idx="2"/>
+              <a:endCxn id="12" idx="0"/>
+            </p:cNvCxnSpPr>
+            <p:nvPr/>
+          </p:nvCxnSpPr>
+          <p:spPr>
+            <a:xfrm>
+              <a:off x="7907800" y="2979766"/>
+              <a:ext cx="0" cy="454770"/>
+            </a:xfrm>
+            <a:prstGeom prst="straightConnector1">
+              <a:avLst/>
+            </a:prstGeom>
+            <a:ln w="25400">
+              <a:solidFill>
+                <a:schemeClr val="tx1"/>
+              </a:solidFill>
+              <a:tailEnd type="triangle"/>
+            </a:ln>
+          </p:spPr>
+          <p:style>
+            <a:lnRef idx="2">
+              <a:schemeClr val="accent1"/>
+            </a:lnRef>
+            <a:fillRef idx="0">
+              <a:schemeClr val="accent1"/>
+            </a:fillRef>
+            <a:effectRef idx="1">
+              <a:schemeClr val="accent1"/>
+            </a:effectRef>
+            <a:fontRef idx="minor">
+              <a:schemeClr val="tx1"/>
+            </a:fontRef>
+          </p:style>
+        </p:cxnSp>
+        <p:sp>
+          <p:nvSpPr>
+            <p:cNvPr id="21" name="Rectangle 20">
+              <a:extLst>
+                <a:ext uri="{FF2B5EF4-FFF2-40B4-BE49-F238E27FC236}">
+                  <a16:creationId xmlns:a16="http://schemas.microsoft.com/office/drawing/2014/main" id="{CF1C8EA4-EB9D-EE32-9BF6-2D8CF5AFE15A}"/>
+                </a:ext>
+              </a:extLst>
+            </p:cNvPr>
+            <p:cNvSpPr/>
+            <p:nvPr/>
+          </p:nvSpPr>
+          <p:spPr>
+            <a:xfrm>
+              <a:off x="4918762" y="3434537"/>
+              <a:ext cx="1572854" cy="846361"/>
+            </a:xfrm>
+            <a:prstGeom prst="rect">
+              <a:avLst/>
+            </a:prstGeom>
+            <a:solidFill>
+              <a:schemeClr val="accent2">
+                <a:lumMod val="60000"/>
+                <a:lumOff val="40000"/>
+              </a:schemeClr>
+            </a:solidFill>
+            <a:ln>
+              <a:solidFill>
+                <a:schemeClr val="tx1"/>
+              </a:solidFill>
+            </a:ln>
+          </p:spPr>
+          <p:style>
+            <a:lnRef idx="2">
+              <a:schemeClr val="accent6"/>
+            </a:lnRef>
+            <a:fillRef idx="1">
+              <a:schemeClr val="lt1"/>
+            </a:fillRef>
+            <a:effectRef idx="0">
+              <a:schemeClr val="accent6"/>
+            </a:effectRef>
+            <a:fontRef idx="minor">
+              <a:schemeClr val="dk1"/>
+            </a:fontRef>
+          </p:style>
+          <p:txBody>
+            <a:bodyPr rtlCol="0" anchor="ctr"/>
+            <a:lstStyle/>
+            <a:p>
+              <a:pPr algn="ctr"/>
+              <a:r>
+                <a:rPr lang="en-US" sz="1600" dirty="0">
+                  <a:latin typeface="Georgia" panose="02040502050405020303" pitchFamily="18" charset="0"/>
+                </a:rPr>
+                <a:t>Stack</a:t>
+              </a:r>
+            </a:p>
+            <a:p>
+              <a:pPr algn="ctr"/>
+              <a:r>
+                <a:rPr lang="en-US" sz="1600" dirty="0">
+                  <a:latin typeface="Georgia" panose="02040502050405020303" pitchFamily="18" charset="0"/>
+                </a:rPr>
+                <a:t>Unwind</a:t>
+              </a:r>
+            </a:p>
+          </p:txBody>
+        </p:sp>
+        <p:cxnSp>
+          <p:nvCxnSpPr>
+            <p:cNvPr id="22" name="Straight Arrow Connector 21">
+              <a:extLst>
+                <a:ext uri="{FF2B5EF4-FFF2-40B4-BE49-F238E27FC236}">
+                  <a16:creationId xmlns:a16="http://schemas.microsoft.com/office/drawing/2014/main" id="{0648FFDE-EC26-F4FD-FE66-F5CE558BF639}"/>
+                </a:ext>
+              </a:extLst>
+            </p:cNvPr>
+            <p:cNvCxnSpPr>
+              <a:stCxn id="12" idx="1"/>
+              <a:endCxn id="21" idx="3"/>
+            </p:cNvCxnSpPr>
+            <p:nvPr/>
+          </p:nvCxnSpPr>
+          <p:spPr>
+            <a:xfrm flipH="1">
+              <a:off x="6491616" y="3857714"/>
+              <a:ext cx="629756" cy="0"/>
+            </a:xfrm>
+            <a:prstGeom prst="straightConnector1">
+              <a:avLst/>
+            </a:prstGeom>
+            <a:ln w="25400">
+              <a:solidFill>
+                <a:schemeClr val="tx1"/>
+              </a:solidFill>
+              <a:tailEnd type="triangle"/>
+            </a:ln>
+          </p:spPr>
+          <p:style>
+            <a:lnRef idx="2">
+              <a:schemeClr val="accent1"/>
+            </a:lnRef>
+            <a:fillRef idx="0">
+              <a:schemeClr val="accent1"/>
+            </a:fillRef>
+            <a:effectRef idx="1">
+              <a:schemeClr val="accent1"/>
+            </a:effectRef>
+            <a:fontRef idx="minor">
+              <a:schemeClr val="tx1"/>
+            </a:fontRef>
+          </p:style>
+        </p:cxnSp>
+        <p:cxnSp>
+          <p:nvCxnSpPr>
+            <p:cNvPr id="23" name="Straight Connector 22">
+              <a:extLst>
+                <a:ext uri="{FF2B5EF4-FFF2-40B4-BE49-F238E27FC236}">
+                  <a16:creationId xmlns:a16="http://schemas.microsoft.com/office/drawing/2014/main" id="{953B9C77-0F56-F50B-ADCF-96E2FD675056}"/>
+                </a:ext>
+              </a:extLst>
+            </p:cNvPr>
+            <p:cNvCxnSpPr>
+              <a:cxnSpLocks/>
+            </p:cNvCxnSpPr>
+            <p:nvPr/>
+          </p:nvCxnSpPr>
+          <p:spPr>
+            <a:xfrm flipV="1">
+              <a:off x="5705189" y="2753452"/>
+              <a:ext cx="0" cy="681085"/>
+            </a:xfrm>
+            <a:prstGeom prst="line">
+              <a:avLst/>
+            </a:prstGeom>
+            <a:ln w="25400">
+              <a:solidFill>
+                <a:schemeClr val="tx1"/>
+              </a:solidFill>
+            </a:ln>
+          </p:spPr>
+          <p:style>
+            <a:lnRef idx="2">
+              <a:schemeClr val="accent1"/>
+            </a:lnRef>
+            <a:fillRef idx="0">
+              <a:schemeClr val="accent1"/>
+            </a:fillRef>
+            <a:effectRef idx="1">
+              <a:schemeClr val="accent1"/>
+            </a:effectRef>
+            <a:fontRef idx="minor">
+              <a:schemeClr val="tx1"/>
+            </a:fontRef>
+          </p:style>
+        </p:cxnSp>
+        <p:sp>
+          <p:nvSpPr>
+            <p:cNvPr id="24" name="TextBox 23">
+              <a:extLst>
+                <a:ext uri="{FF2B5EF4-FFF2-40B4-BE49-F238E27FC236}">
+                  <a16:creationId xmlns:a16="http://schemas.microsoft.com/office/drawing/2014/main" id="{9CA6ED10-FA72-F69D-FA30-CCFCFB08D33D}"/>
+                </a:ext>
+              </a:extLst>
+            </p:cNvPr>
+            <p:cNvSpPr txBox="1"/>
+            <p:nvPr/>
+          </p:nvSpPr>
+          <p:spPr>
+            <a:xfrm>
+              <a:off x="4820064" y="807752"/>
+              <a:ext cx="1770251" cy="584775"/>
+            </a:xfrm>
+            <a:prstGeom prst="rect">
+              <a:avLst/>
+            </a:prstGeom>
+            <a:noFill/>
+          </p:spPr>
+          <p:txBody>
+            <a:bodyPr wrap="square" rtlCol="0">
+              <a:spAutoFit/>
+            </a:bodyPr>
+            <a:lstStyle/>
+            <a:p>
+              <a:pPr algn="ctr"/>
+              <a:r>
+                <a:rPr lang="en-US" sz="1600" dirty="0">
+                  <a:latin typeface="Georgia" panose="02040502050405020303" pitchFamily="18" charset="0"/>
+                </a:rPr>
+                <a:t>In-kernel</a:t>
+              </a:r>
+            </a:p>
+            <a:p>
+              <a:pPr algn="ctr"/>
+              <a:r>
+                <a:rPr lang="en-US" sz="1600" dirty="0">
+                  <a:latin typeface="Georgia" panose="02040502050405020303" pitchFamily="18" charset="0"/>
+                </a:rPr>
+                <a:t>runtime</a:t>
+              </a:r>
+            </a:p>
+          </p:txBody>
+        </p:sp>
+        <p:cxnSp>
+          <p:nvCxnSpPr>
+            <p:cNvPr id="25" name="Elbow Connector 24">
+              <a:extLst>
+                <a:ext uri="{FF2B5EF4-FFF2-40B4-BE49-F238E27FC236}">
+                  <a16:creationId xmlns:a16="http://schemas.microsoft.com/office/drawing/2014/main" id="{18B94082-7374-9D8F-C1D3-A46B9DBBE1B4}"/>
+                </a:ext>
+              </a:extLst>
+            </p:cNvPr>
+            <p:cNvCxnSpPr>
+              <a:cxnSpLocks/>
+              <a:stCxn id="13" idx="0"/>
+            </p:cNvCxnSpPr>
+            <p:nvPr/>
+          </p:nvCxnSpPr>
+          <p:spPr>
+            <a:xfrm rot="5400000" flipH="1" flipV="1">
+              <a:off x="4935681" y="1629842"/>
+              <a:ext cx="1338022" cy="3050460"/>
+            </a:xfrm>
+            <a:prstGeom prst="bentConnector2">
+              <a:avLst/>
+            </a:prstGeom>
+            <a:ln>
+              <a:solidFill>
+                <a:schemeClr val="tx1"/>
+              </a:solidFill>
+              <a:tailEnd type="triangle"/>
+            </a:ln>
+          </p:spPr>
+          <p:style>
+            <a:lnRef idx="2">
+              <a:schemeClr val="accent1"/>
+            </a:lnRef>
+            <a:fillRef idx="0">
+              <a:schemeClr val="accent1"/>
+            </a:fillRef>
+            <a:effectRef idx="1">
+              <a:schemeClr val="accent1"/>
+            </a:effectRef>
+            <a:fontRef idx="minor">
+              <a:schemeClr val="tx1"/>
+            </a:fontRef>
+          </p:style>
+        </p:cxnSp>
+        <p:cxnSp>
+          <p:nvCxnSpPr>
+            <p:cNvPr id="26" name="Elbow Connector 25">
+              <a:extLst>
+                <a:ext uri="{FF2B5EF4-FFF2-40B4-BE49-F238E27FC236}">
+                  <a16:creationId xmlns:a16="http://schemas.microsoft.com/office/drawing/2014/main" id="{C783FEA0-B0E6-D612-C0CF-5969CEAFE994}"/>
+                </a:ext>
+              </a:extLst>
+            </p:cNvPr>
+            <p:cNvCxnSpPr>
+              <a:cxnSpLocks/>
+            </p:cNvCxnSpPr>
+            <p:nvPr/>
+          </p:nvCxnSpPr>
+          <p:spPr>
+            <a:xfrm rot="10800000" flipV="1">
+              <a:off x="4341236" y="2753450"/>
+              <a:ext cx="2772524" cy="1081806"/>
+            </a:xfrm>
+            <a:prstGeom prst="bentConnector3">
+              <a:avLst>
+                <a:gd name="adj1" fmla="val 100168"/>
+              </a:avLst>
+            </a:prstGeom>
+            <a:ln>
+              <a:solidFill>
+                <a:schemeClr val="tx1"/>
+              </a:solidFill>
+              <a:tailEnd type="triangle"/>
+            </a:ln>
+          </p:spPr>
+          <p:style>
+            <a:lnRef idx="2">
+              <a:schemeClr val="accent1"/>
+            </a:lnRef>
+            <a:fillRef idx="0">
+              <a:schemeClr val="accent1"/>
+            </a:fillRef>
+            <a:effectRef idx="1">
+              <a:schemeClr val="accent1"/>
+            </a:effectRef>
+            <a:fontRef idx="minor">
+              <a:schemeClr val="tx1"/>
+            </a:fontRef>
+          </p:style>
+        </p:cxnSp>
+        <p:sp>
+          <p:nvSpPr>
+            <p:cNvPr id="27" name="Folded Corner 26">
+              <a:extLst>
+                <a:ext uri="{FF2B5EF4-FFF2-40B4-BE49-F238E27FC236}">
+                  <a16:creationId xmlns:a16="http://schemas.microsoft.com/office/drawing/2014/main" id="{0F51BDE6-723F-34D0-7FDC-F626B61E3933}"/>
+                </a:ext>
+              </a:extLst>
+            </p:cNvPr>
+            <p:cNvSpPr/>
+            <p:nvPr/>
+          </p:nvSpPr>
+          <p:spPr>
+            <a:xfrm>
+              <a:off x="1660198" y="3824083"/>
+              <a:ext cx="1572854" cy="979116"/>
+            </a:xfrm>
+            <a:prstGeom prst="foldedCorner">
+              <a:avLst>
+                <a:gd name="adj" fmla="val 20016"/>
+              </a:avLst>
+            </a:prstGeom>
+            <a:solidFill>
+              <a:srgbClr val="C00000">
+                <a:alpha val="46197"/>
+              </a:srgbClr>
+            </a:solidFill>
+            <a:ln>
+              <a:solidFill>
+                <a:schemeClr val="tx1"/>
+              </a:solidFill>
+            </a:ln>
+          </p:spPr>
+          <p:style>
+            <a:lnRef idx="2">
+              <a:schemeClr val="accent6"/>
+            </a:lnRef>
+            <a:fillRef idx="1">
+              <a:schemeClr val="lt1"/>
+            </a:fillRef>
+            <a:effectRef idx="0">
+              <a:schemeClr val="accent6"/>
+            </a:effectRef>
+            <a:fontRef idx="minor">
+              <a:schemeClr val="dk1"/>
+            </a:fontRef>
+          </p:style>
+          <p:txBody>
+            <a:bodyPr rtlCol="0" anchor="ctr"/>
+            <a:lstStyle/>
+            <a:p>
+              <a:pPr algn="ctr"/>
+              <a:r>
+                <a:rPr lang="en-US" sz="1600" dirty="0">
+                  <a:solidFill>
+                    <a:schemeClr val="tx1"/>
+                  </a:solidFill>
+                  <a:latin typeface="Georgia" panose="02040502050405020303" pitchFamily="18" charset="0"/>
+                </a:rPr>
+                <a:t>Rust Code</a:t>
+              </a:r>
+            </a:p>
+          </p:txBody>
+        </p:sp>
+        <p:sp>
+          <p:nvSpPr>
+            <p:cNvPr id="28" name="TextBox 27">
+              <a:extLst>
+                <a:ext uri="{FF2B5EF4-FFF2-40B4-BE49-F238E27FC236}">
+                  <a16:creationId xmlns:a16="http://schemas.microsoft.com/office/drawing/2014/main" id="{00FCAF1C-B023-0991-96D5-A264510EEADC}"/>
+                </a:ext>
+              </a:extLst>
+            </p:cNvPr>
+            <p:cNvSpPr txBox="1"/>
+            <p:nvPr/>
+          </p:nvSpPr>
+          <p:spPr>
+            <a:xfrm>
+              <a:off x="1060854" y="989157"/>
+              <a:ext cx="1572854" cy="338554"/>
+            </a:xfrm>
+            <a:prstGeom prst="rect">
+              <a:avLst/>
+            </a:prstGeom>
+            <a:noFill/>
+          </p:spPr>
+          <p:txBody>
+            <a:bodyPr wrap="square" rtlCol="0">
+              <a:spAutoFit/>
+            </a:bodyPr>
+            <a:lstStyle/>
+            <a:p>
+              <a:pPr algn="ctr"/>
+              <a:r>
+                <a:rPr lang="en-US" sz="1600" dirty="0">
+                  <a:latin typeface="Georgia" panose="02040502050405020303" pitchFamily="18" charset="0"/>
+                </a:rPr>
+                <a:t>Rust Compiler</a:t>
+              </a:r>
+            </a:p>
+          </p:txBody>
+        </p:sp>
+        <p:sp>
+          <p:nvSpPr>
+            <p:cNvPr id="29" name="Rectangle 28">
+              <a:extLst>
+                <a:ext uri="{FF2B5EF4-FFF2-40B4-BE49-F238E27FC236}">
+                  <a16:creationId xmlns:a16="http://schemas.microsoft.com/office/drawing/2014/main" id="{9CEC7092-55EA-C7E8-2824-A3467A6B1F8E}"/>
+                </a:ext>
+              </a:extLst>
+            </p:cNvPr>
+            <p:cNvSpPr/>
+            <p:nvPr/>
+          </p:nvSpPr>
+          <p:spPr>
+            <a:xfrm>
+              <a:off x="2031801" y="1972036"/>
+              <a:ext cx="1523008" cy="930225"/>
+            </a:xfrm>
+            <a:prstGeom prst="rect">
+              <a:avLst/>
+            </a:prstGeom>
+            <a:solidFill>
+              <a:schemeClr val="accent2">
+                <a:lumMod val="60000"/>
+                <a:lumOff val="40000"/>
+              </a:schemeClr>
+            </a:solidFill>
+            <a:ln>
+              <a:noFill/>
+            </a:ln>
+          </p:spPr>
+          <p:style>
+            <a:lnRef idx="2">
+              <a:schemeClr val="accent6"/>
+            </a:lnRef>
+            <a:fillRef idx="1">
+              <a:schemeClr val="lt1"/>
+            </a:fillRef>
+            <a:effectRef idx="0">
+              <a:schemeClr val="accent6"/>
+            </a:effectRef>
+            <a:fontRef idx="minor">
+              <a:schemeClr val="dk1"/>
+            </a:fontRef>
+          </p:style>
+          <p:txBody>
+            <a:bodyPr rtlCol="0" anchor="ctr"/>
+            <a:lstStyle/>
+            <a:p>
+              <a:pPr algn="ctr"/>
+              <a:r>
+                <a:rPr lang="en-US" sz="1600" dirty="0">
+                  <a:latin typeface="Georgia" panose="02040502050405020303" pitchFamily="18" charset="0"/>
+                </a:rPr>
+                <a:t>Stack Check</a:t>
+              </a:r>
+            </a:p>
+          </p:txBody>
+        </p:sp>
+        <p:sp>
+          <p:nvSpPr>
+            <p:cNvPr id="30" name="Rectangle 29">
+              <a:extLst>
+                <a:ext uri="{FF2B5EF4-FFF2-40B4-BE49-F238E27FC236}">
+                  <a16:creationId xmlns:a16="http://schemas.microsoft.com/office/drawing/2014/main" id="{522DBB3B-BB07-25D8-60EB-6277701CA08A}"/>
+                </a:ext>
+              </a:extLst>
+            </p:cNvPr>
+            <p:cNvSpPr/>
+            <p:nvPr/>
+          </p:nvSpPr>
+          <p:spPr>
+            <a:xfrm>
+              <a:off x="244816" y="1972036"/>
+              <a:ext cx="1553405" cy="930225"/>
+            </a:xfrm>
+            <a:prstGeom prst="rect">
+              <a:avLst/>
+            </a:prstGeom>
+            <a:solidFill>
+              <a:schemeClr val="accent2">
+                <a:lumMod val="60000"/>
+                <a:lumOff val="40000"/>
+              </a:schemeClr>
+            </a:solidFill>
+            <a:ln>
+              <a:noFill/>
+            </a:ln>
+          </p:spPr>
+          <p:style>
+            <a:lnRef idx="2">
+              <a:schemeClr val="accent6"/>
+            </a:lnRef>
+            <a:fillRef idx="1">
+              <a:schemeClr val="lt1"/>
+            </a:fillRef>
+            <a:effectRef idx="0">
+              <a:schemeClr val="accent6"/>
+            </a:effectRef>
+            <a:fontRef idx="minor">
+              <a:schemeClr val="dk1"/>
+            </a:fontRef>
+          </p:style>
+          <p:txBody>
+            <a:bodyPr rtlCol="0" anchor="ctr"/>
+            <a:lstStyle/>
+            <a:p>
+              <a:pPr algn="ctr"/>
+              <a:r>
+                <a:rPr lang="en-US" sz="1600" dirty="0">
+                  <a:latin typeface="Georgia" panose="02040502050405020303" pitchFamily="18" charset="0"/>
+                </a:rPr>
+                <a:t>   Mem Check</a:t>
+              </a:r>
+            </a:p>
+            <a:p>
+              <a:pPr algn="ctr"/>
+              <a:r>
+                <a:rPr lang="en-US" sz="1600" dirty="0">
+                  <a:latin typeface="Georgia" panose="02040502050405020303" pitchFamily="18" charset="0"/>
+                </a:rPr>
+                <a:t>   Type Check</a:t>
+              </a:r>
+            </a:p>
+            <a:p>
+              <a:pPr algn="ctr"/>
+              <a:r>
+                <a:rPr lang="en-US" sz="1600" dirty="0">
+                  <a:latin typeface="Georgia" panose="02040502050405020303" pitchFamily="18" charset="0"/>
+                </a:rPr>
+                <a:t>…</a:t>
+              </a:r>
+            </a:p>
+          </p:txBody>
+        </p:sp>
+        <p:sp>
+          <p:nvSpPr>
+            <p:cNvPr id="31" name="Rectangle 30">
+              <a:extLst>
+                <a:ext uri="{FF2B5EF4-FFF2-40B4-BE49-F238E27FC236}">
+                  <a16:creationId xmlns:a16="http://schemas.microsoft.com/office/drawing/2014/main" id="{3F70D7DF-C45E-340A-E269-26F57BACD2B9}"/>
+                </a:ext>
+              </a:extLst>
+            </p:cNvPr>
+            <p:cNvSpPr/>
+            <p:nvPr/>
+          </p:nvSpPr>
+          <p:spPr>
+            <a:xfrm>
+              <a:off x="200581" y="1536798"/>
+              <a:ext cx="1646700" cy="1442966"/>
+            </a:xfrm>
+            <a:prstGeom prst="rect">
+              <a:avLst/>
+            </a:prstGeom>
+            <a:noFill/>
+            <a:ln w="19050"/>
+          </p:spPr>
+          <p:style>
+            <a:lnRef idx="2">
+              <a:schemeClr val="accent1">
+                <a:shade val="50000"/>
+              </a:schemeClr>
+            </a:lnRef>
+            <a:fillRef idx="1">
+              <a:schemeClr val="accent1"/>
+            </a:fillRef>
+            <a:effectRef idx="0">
+              <a:schemeClr val="accent1"/>
+            </a:effectRef>
+            <a:fontRef idx="minor">
+              <a:schemeClr val="lt1"/>
+            </a:fontRef>
+          </p:style>
+          <p:txBody>
+            <a:bodyPr tIns="0" bIns="0" rtlCol="0" anchor="ctr"/>
+            <a:lstStyle/>
+            <a:p>
+              <a:endParaRPr lang="en-US" sz="1602" dirty="0">
+                <a:solidFill>
+                  <a:schemeClr val="tx1"/>
+                </a:solidFill>
+                <a:latin typeface="Times" pitchFamily="2" charset="0"/>
+              </a:endParaRPr>
+            </a:p>
+          </p:txBody>
+        </p:sp>
+        <p:sp>
+          <p:nvSpPr>
+            <p:cNvPr id="32" name="TextBox 31">
+              <a:extLst>
+                <a:ext uri="{FF2B5EF4-FFF2-40B4-BE49-F238E27FC236}">
+                  <a16:creationId xmlns:a16="http://schemas.microsoft.com/office/drawing/2014/main" id="{A637B06F-4280-4A3A-76E4-95C33CB9D0E7}"/>
+                </a:ext>
+              </a:extLst>
+            </p:cNvPr>
+            <p:cNvSpPr txBox="1"/>
+            <p:nvPr/>
+          </p:nvSpPr>
+          <p:spPr>
+            <a:xfrm>
+              <a:off x="361790" y="1572561"/>
+              <a:ext cx="1332288" cy="369332"/>
+            </a:xfrm>
+            <a:prstGeom prst="rect">
+              <a:avLst/>
+            </a:prstGeom>
+            <a:noFill/>
+          </p:spPr>
+          <p:txBody>
+            <a:bodyPr wrap="none" rtlCol="0">
+              <a:spAutoFit/>
+            </a:bodyPr>
+            <a:lstStyle/>
+            <a:p>
+              <a:r>
+                <a:rPr lang="en-US" dirty="0"/>
+                <a:t>Lang Safety</a:t>
+              </a:r>
+            </a:p>
+          </p:txBody>
+        </p:sp>
+        <p:sp>
+          <p:nvSpPr>
+            <p:cNvPr id="33" name="Rectangle 32">
+              <a:extLst>
+                <a:ext uri="{FF2B5EF4-FFF2-40B4-BE49-F238E27FC236}">
+                  <a16:creationId xmlns:a16="http://schemas.microsoft.com/office/drawing/2014/main" id="{562D8948-E79D-DCA4-9D19-B9B2C7F68DD2}"/>
+                </a:ext>
+              </a:extLst>
+            </p:cNvPr>
+            <p:cNvSpPr/>
+            <p:nvPr/>
+          </p:nvSpPr>
+          <p:spPr>
+            <a:xfrm>
+              <a:off x="1955319" y="1536798"/>
+              <a:ext cx="1668024" cy="1442966"/>
+            </a:xfrm>
+            <a:prstGeom prst="rect">
+              <a:avLst/>
+            </a:prstGeom>
+            <a:noFill/>
+            <a:ln w="19050"/>
+          </p:spPr>
+          <p:style>
+            <a:lnRef idx="2">
+              <a:schemeClr val="accent1">
+                <a:shade val="50000"/>
+              </a:schemeClr>
+            </a:lnRef>
+            <a:fillRef idx="1">
+              <a:schemeClr val="accent1"/>
+            </a:fillRef>
+            <a:effectRef idx="0">
+              <a:schemeClr val="accent1"/>
+            </a:effectRef>
+            <a:fontRef idx="minor">
+              <a:schemeClr val="lt1"/>
+            </a:fontRef>
+          </p:style>
+          <p:txBody>
+            <a:bodyPr tIns="0" bIns="0" rtlCol="0" anchor="ctr"/>
+            <a:lstStyle/>
+            <a:p>
+              <a:endParaRPr lang="en-US" sz="1602" dirty="0">
+                <a:solidFill>
+                  <a:schemeClr val="tx1"/>
+                </a:solidFill>
+                <a:latin typeface="Times" pitchFamily="2" charset="0"/>
+              </a:endParaRPr>
+            </a:p>
+          </p:txBody>
+        </p:sp>
+        <p:sp>
+          <p:nvSpPr>
+            <p:cNvPr id="34" name="TextBox 33">
+              <a:extLst>
+                <a:ext uri="{FF2B5EF4-FFF2-40B4-BE49-F238E27FC236}">
+                  <a16:creationId xmlns:a16="http://schemas.microsoft.com/office/drawing/2014/main" id="{CC1DE6BC-09C5-E211-A003-B6946A4D0B38}"/>
+                </a:ext>
+              </a:extLst>
+            </p:cNvPr>
+            <p:cNvSpPr txBox="1"/>
+            <p:nvPr/>
+          </p:nvSpPr>
+          <p:spPr>
+            <a:xfrm>
+              <a:off x="2212134" y="1565838"/>
+              <a:ext cx="1212191" cy="369332"/>
+            </a:xfrm>
+            <a:prstGeom prst="rect">
+              <a:avLst/>
+            </a:prstGeom>
+            <a:noFill/>
+          </p:spPr>
+          <p:txBody>
+            <a:bodyPr wrap="none" rtlCol="0">
+              <a:spAutoFit/>
+            </a:bodyPr>
+            <a:lstStyle/>
+            <a:p>
+              <a:r>
+                <a:rPr lang="en-US" dirty="0"/>
+                <a:t>Rex Safety</a:t>
+              </a:r>
+            </a:p>
+          </p:txBody>
+        </p:sp>
+        <p:cxnSp>
+          <p:nvCxnSpPr>
+            <p:cNvPr id="35" name="Elbow Connector 34">
+              <a:extLst>
+                <a:ext uri="{FF2B5EF4-FFF2-40B4-BE49-F238E27FC236}">
+                  <a16:creationId xmlns:a16="http://schemas.microsoft.com/office/drawing/2014/main" id="{AE968D6C-5B02-4F4F-D8DC-1C5D62679B43}"/>
+                </a:ext>
+              </a:extLst>
+            </p:cNvPr>
+            <p:cNvCxnSpPr>
+              <a:cxnSpLocks/>
+              <a:stCxn id="27" idx="1"/>
+              <a:endCxn id="4" idx="2"/>
+            </p:cNvCxnSpPr>
+            <p:nvPr/>
+          </p:nvCxnSpPr>
+          <p:spPr>
+            <a:xfrm rot="10800000" flipH="1">
+              <a:off x="1660197" y="3482881"/>
+              <a:ext cx="307309" cy="830761"/>
+            </a:xfrm>
+            <a:prstGeom prst="bentConnector4">
+              <a:avLst>
+                <a:gd name="adj1" fmla="val -74388"/>
+                <a:gd name="adj2" fmla="val 79464"/>
+              </a:avLst>
+            </a:prstGeom>
+            <a:ln>
+              <a:solidFill>
+                <a:schemeClr val="tx1"/>
+              </a:solidFill>
+              <a:tailEnd type="triangle"/>
+            </a:ln>
+          </p:spPr>
+          <p:style>
+            <a:lnRef idx="2">
+              <a:schemeClr val="accent1"/>
+            </a:lnRef>
+            <a:fillRef idx="0">
+              <a:schemeClr val="accent1"/>
+            </a:fillRef>
+            <a:effectRef idx="1">
+              <a:schemeClr val="accent1"/>
+            </a:effectRef>
+            <a:fontRef idx="minor">
+              <a:schemeClr val="tx1"/>
+            </a:fontRef>
+          </p:style>
+        </p:cxnSp>
+        <p:cxnSp>
+          <p:nvCxnSpPr>
+            <p:cNvPr id="36" name="Elbow Connector 35">
+              <a:extLst>
+                <a:ext uri="{FF2B5EF4-FFF2-40B4-BE49-F238E27FC236}">
+                  <a16:creationId xmlns:a16="http://schemas.microsoft.com/office/drawing/2014/main" id="{1775D3A0-B4B6-0C47-5171-5DA071576299}"/>
+                </a:ext>
+              </a:extLst>
+            </p:cNvPr>
+            <p:cNvCxnSpPr>
+              <a:cxnSpLocks/>
+              <a:stCxn id="4" idx="3"/>
+              <a:endCxn id="6" idx="0"/>
+            </p:cNvCxnSpPr>
+            <p:nvPr/>
+          </p:nvCxnSpPr>
+          <p:spPr>
+            <a:xfrm flipV="1">
+              <a:off x="3807264" y="704152"/>
+              <a:ext cx="4845293" cy="1441164"/>
+            </a:xfrm>
+            <a:prstGeom prst="bentConnector4">
+              <a:avLst>
+                <a:gd name="adj1" fmla="val 9081"/>
+                <a:gd name="adj2" fmla="val 129769"/>
+              </a:avLst>
+            </a:prstGeom>
+            <a:ln>
+              <a:solidFill>
+                <a:schemeClr val="tx1"/>
+              </a:solidFill>
+              <a:tailEnd type="triangle"/>
+            </a:ln>
+          </p:spPr>
+          <p:style>
+            <a:lnRef idx="2">
+              <a:schemeClr val="accent1"/>
+            </a:lnRef>
+            <a:fillRef idx="0">
+              <a:schemeClr val="accent1"/>
+            </a:fillRef>
+            <a:effectRef idx="1">
+              <a:schemeClr val="accent1"/>
+            </a:effectRef>
+            <a:fontRef idx="minor">
+              <a:schemeClr val="tx1"/>
+            </a:fontRef>
+          </p:style>
+        </p:cxnSp>
+        <p:sp>
+          <p:nvSpPr>
+            <p:cNvPr id="37" name="Rectangle 36">
+              <a:extLst>
+                <a:ext uri="{FF2B5EF4-FFF2-40B4-BE49-F238E27FC236}">
+                  <a16:creationId xmlns:a16="http://schemas.microsoft.com/office/drawing/2014/main" id="{650FE1B2-2690-8308-C90D-DF7EA890C4A1}"/>
+                </a:ext>
+              </a:extLst>
+            </p:cNvPr>
+            <p:cNvSpPr/>
+            <p:nvPr/>
+          </p:nvSpPr>
+          <p:spPr>
+            <a:xfrm>
+              <a:off x="7748451" y="0"/>
+              <a:ext cx="1777284" cy="557131"/>
+            </a:xfrm>
+            <a:prstGeom prst="rect">
+              <a:avLst/>
+            </a:prstGeom>
+            <a:solidFill>
+              <a:schemeClr val="accent2">
+                <a:lumMod val="40000"/>
+                <a:lumOff val="60000"/>
+              </a:schemeClr>
+            </a:solidFill>
+            <a:ln>
+              <a:solidFill>
+                <a:schemeClr val="tx1"/>
+              </a:solidFill>
+            </a:ln>
+          </p:spPr>
+          <p:style>
+            <a:lnRef idx="2">
+              <a:schemeClr val="accent6"/>
+            </a:lnRef>
+            <a:fillRef idx="1">
+              <a:schemeClr val="lt1"/>
+            </a:fillRef>
+            <a:effectRef idx="0">
+              <a:schemeClr val="accent6"/>
+            </a:effectRef>
+            <a:fontRef idx="minor">
+              <a:schemeClr val="dk1"/>
+            </a:fontRef>
+          </p:style>
+          <p:txBody>
+            <a:bodyPr rtlCol="0" anchor="ctr"/>
+            <a:lstStyle/>
+            <a:p>
+              <a:pPr algn="ctr"/>
+              <a:r>
+                <a:rPr lang="en-US" sz="1600" dirty="0" err="1">
+                  <a:latin typeface="Georgia" panose="02040502050405020303" pitchFamily="18" charset="0"/>
+                </a:rPr>
+                <a:t>rex_prog_load</a:t>
+              </a:r>
+              <a:endParaRPr lang="en-US" sz="1600" dirty="0">
+                <a:latin typeface="Georgia" panose="02040502050405020303" pitchFamily="18" charset="0"/>
+              </a:endParaRPr>
+            </a:p>
+          </p:txBody>
+        </p:sp>
+      </p:grpSp>
+    </p:spTree>
+    <p:extLst>
+      <p:ext uri="{BB962C8B-B14F-4D97-AF65-F5344CB8AC3E}">
+        <p14:creationId xmlns:p14="http://schemas.microsoft.com/office/powerpoint/2010/main" val="2033372776"/>
+      </p:ext>
+    </p:extLst>
+  </p:cSld>
+  <p:clrMapOvr>
+    <a:masterClrMapping/>
+  </p:clrMapOvr>
+</p:sld>
+</file>
+
+<file path=ppt/slides/slide2.xml><?xml version="1.0" encoding="utf-8"?>
 <p:sld xmlns:a="http://schemas.openxmlformats.org/drawingml/2006/main" xmlns:r="http://schemas.openxmlformats.org/officeDocument/2006/relationships" xmlns:p="http://schemas.openxmlformats.org/presentationml/2006/main">
   <p:cSld>
     <p:spTree>

</xml_diff>